<commit_message>
730PM 112718 Update with PPT Presentation change.
</commit_message>
<xml_diff>
--- a/Presentation/Movie Search Presentation.pptx
+++ b/Presentation/Movie Search Presentation.pptx
@@ -8461,7 +8461,45 @@
           <a:p>
             <a:r>
               <a:rPr lang="en-US" dirty="0"/>
-              <a:t>Movie Search is a utility that will provide users with movie names, descriptions (To include actors, actress, etc.), trailers, and google map directions.</a:t>
+              <a:t>Movie Search is a utility that will provide users with..</a:t>
+            </a:r>
+          </a:p>
+          <a:p>
+            <a:endParaRPr lang="en-US" dirty="0"/>
+          </a:p>
+          <a:p>
+            <a:pPr lvl="1"/>
+            <a:r>
+              <a:rPr lang="en-US" dirty="0"/>
+              <a:t>Movie names</a:t>
+            </a:r>
+          </a:p>
+          <a:p>
+            <a:pPr lvl="1"/>
+            <a:r>
+              <a:rPr lang="en-US" dirty="0"/>
+              <a:t>Descriptions (actors, actress, etc.)</a:t>
+            </a:r>
+          </a:p>
+          <a:p>
+            <a:pPr lvl="1"/>
+            <a:r>
+              <a:rPr lang="en-US" dirty="0"/>
+              <a:t>Trailers</a:t>
+            </a:r>
+          </a:p>
+          <a:p>
+            <a:pPr lvl="1"/>
+            <a:r>
+              <a:rPr lang="en-US" dirty="0"/>
+              <a:t>Theatres</a:t>
+            </a:r>
+          </a:p>
+          <a:p>
+            <a:pPr lvl="1"/>
+            <a:r>
+              <a:rPr lang="en-US" dirty="0"/>
+              <a:t>Google map directions.</a:t>
             </a:r>
           </a:p>
           <a:p>

</xml_diff>

<commit_message>
645PM 1128718 Update with PPT Presentation change.
</commit_message>
<xml_diff>
--- a/Presentation/Movie Search Presentation.pptx
+++ b/Presentation/Movie Search Presentation.pptx
@@ -220,7 +220,7 @@
           <a:p>
             <a:fld id="{E7E643A0-4DBD-CB4C-9DC5-E04D76B82312}" type="datetimeFigureOut">
               <a:rPr lang="en-US" smtClean="0"/>
-              <a:t>11/27/18</a:t>
+              <a:t>11/28/18</a:t>
             </a:fld>
             <a:endParaRPr lang="en-US"/>
           </a:p>
@@ -845,7 +845,7 @@
           <a:p>
             <a:fld id="{48A87A34-81AB-432B-8DAE-1953F412C126}" type="datetimeFigureOut">
               <a:rPr lang="en-US" smtClean="0"/>
-              <a:t>11/27/18</a:t>
+              <a:t>11/28/18</a:t>
             </a:fld>
             <a:endParaRPr lang="en-US" dirty="0"/>
           </a:p>
@@ -1260,7 +1260,7 @@
             <a:fld id="{48A87A34-81AB-432B-8DAE-1953F412C126}" type="datetimeFigureOut">
               <a:rPr lang="en-US" smtClean="0"/>
               <a:pPr/>
-              <a:t>11/27/18</a:t>
+              <a:t>11/28/18</a:t>
             </a:fld>
             <a:endParaRPr lang="en-US" dirty="0"/>
           </a:p>
@@ -1598,7 +1598,7 @@
             <a:fld id="{48A87A34-81AB-432B-8DAE-1953F412C126}" type="datetimeFigureOut">
               <a:rPr lang="en-US" smtClean="0"/>
               <a:pPr/>
-              <a:t>11/27/18</a:t>
+              <a:t>11/28/18</a:t>
             </a:fld>
             <a:endParaRPr lang="en-US" dirty="0"/>
           </a:p>
@@ -2005,7 +2005,7 @@
             <a:fld id="{48A87A34-81AB-432B-8DAE-1953F412C126}" type="datetimeFigureOut">
               <a:rPr lang="en-US" smtClean="0"/>
               <a:pPr/>
-              <a:t>11/27/18</a:t>
+              <a:t>11/28/18</a:t>
             </a:fld>
             <a:endParaRPr lang="en-US" dirty="0"/>
           </a:p>
@@ -2575,7 +2575,7 @@
             <a:fld id="{48A87A34-81AB-432B-8DAE-1953F412C126}" type="datetimeFigureOut">
               <a:rPr lang="en-US" smtClean="0"/>
               <a:pPr/>
-              <a:t>11/27/18</a:t>
+              <a:t>11/28/18</a:t>
             </a:fld>
             <a:endParaRPr lang="en-US" dirty="0"/>
           </a:p>
@@ -3258,7 +3258,7 @@
             <a:fld id="{48A87A34-81AB-432B-8DAE-1953F412C126}" type="datetimeFigureOut">
               <a:rPr lang="en-US" smtClean="0"/>
               <a:pPr/>
-              <a:t>11/27/18</a:t>
+              <a:t>11/28/18</a:t>
             </a:fld>
             <a:endParaRPr lang="en-US" dirty="0"/>
           </a:p>
@@ -4173,7 +4173,7 @@
             <a:fld id="{48A87A34-81AB-432B-8DAE-1953F412C126}" type="datetimeFigureOut">
               <a:rPr lang="en-US" smtClean="0"/>
               <a:pPr/>
-              <a:t>11/27/18</a:t>
+              <a:t>11/28/18</a:t>
             </a:fld>
             <a:endParaRPr lang="en-US" dirty="0"/>
           </a:p>
@@ -4487,7 +4487,7 @@
           <a:p>
             <a:fld id="{48A87A34-81AB-432B-8DAE-1953F412C126}" type="datetimeFigureOut">
               <a:rPr lang="en-US" smtClean="0"/>
-              <a:t>11/27/18</a:t>
+              <a:t>11/28/18</a:t>
             </a:fld>
             <a:endParaRPr lang="en-US" dirty="0"/>
           </a:p>
@@ -4751,7 +4751,7 @@
           <a:p>
             <a:fld id="{48A87A34-81AB-432B-8DAE-1953F412C126}" type="datetimeFigureOut">
               <a:rPr lang="en-US" smtClean="0"/>
-              <a:t>11/27/18</a:t>
+              <a:t>11/28/18</a:t>
             </a:fld>
             <a:endParaRPr lang="en-US" dirty="0"/>
           </a:p>
@@ -5074,7 +5074,7 @@
           <a:p>
             <a:fld id="{48A87A34-81AB-432B-8DAE-1953F412C126}" type="datetimeFigureOut">
               <a:rPr lang="en-US" smtClean="0"/>
-              <a:t>11/27/18</a:t>
+              <a:t>11/28/18</a:t>
             </a:fld>
             <a:endParaRPr lang="en-US" dirty="0"/>
           </a:p>
@@ -5463,7 +5463,7 @@
           <a:p>
             <a:fld id="{48A87A34-81AB-432B-8DAE-1953F412C126}" type="datetimeFigureOut">
               <a:rPr lang="en-US" smtClean="0"/>
-              <a:t>11/27/18</a:t>
+              <a:t>11/28/18</a:t>
             </a:fld>
             <a:endParaRPr lang="en-US" dirty="0"/>
           </a:p>
@@ -5839,7 +5839,7 @@
           <a:p>
             <a:fld id="{48A87A34-81AB-432B-8DAE-1953F412C126}" type="datetimeFigureOut">
               <a:rPr lang="en-US" smtClean="0"/>
-              <a:t>11/27/18</a:t>
+              <a:t>11/28/18</a:t>
             </a:fld>
             <a:endParaRPr lang="en-US" dirty="0"/>
           </a:p>
@@ -6345,7 +6345,7 @@
           <a:p>
             <a:fld id="{48A87A34-81AB-432B-8DAE-1953F412C126}" type="datetimeFigureOut">
               <a:rPr lang="en-US" smtClean="0"/>
-              <a:t>11/27/18</a:t>
+              <a:t>11/28/18</a:t>
             </a:fld>
             <a:endParaRPr lang="en-US" dirty="0"/>
           </a:p>
@@ -6602,7 +6602,7 @@
           <a:p>
             <a:fld id="{48A87A34-81AB-432B-8DAE-1953F412C126}" type="datetimeFigureOut">
               <a:rPr lang="en-US" smtClean="0"/>
-              <a:t>11/27/18</a:t>
+              <a:t>11/28/18</a:t>
             </a:fld>
             <a:endParaRPr lang="en-US" dirty="0"/>
           </a:p>
@@ -6765,7 +6765,7 @@
           <a:p>
             <a:fld id="{48A87A34-81AB-432B-8DAE-1953F412C126}" type="datetimeFigureOut">
               <a:rPr lang="en-US" smtClean="0"/>
-              <a:t>11/27/18</a:t>
+              <a:t>11/28/18</a:t>
             </a:fld>
             <a:endParaRPr lang="en-US" dirty="0"/>
           </a:p>
@@ -7155,7 +7155,7 @@
           <a:p>
             <a:fld id="{48A87A34-81AB-432B-8DAE-1953F412C126}" type="datetimeFigureOut">
               <a:rPr lang="en-US" smtClean="0"/>
-              <a:t>11/27/18</a:t>
+              <a:t>11/28/18</a:t>
             </a:fld>
             <a:endParaRPr lang="en-US" dirty="0"/>
           </a:p>
@@ -7564,7 +7564,7 @@
           <a:p>
             <a:fld id="{48A87A34-81AB-432B-8DAE-1953F412C126}" type="datetimeFigureOut">
               <a:rPr lang="en-US" smtClean="0"/>
-              <a:t>11/27/18</a:t>
+              <a:t>11/28/18</a:t>
             </a:fld>
             <a:endParaRPr lang="en-US" dirty="0"/>
           </a:p>
@@ -7809,7 +7809,7 @@
             <a:fld id="{48A87A34-81AB-432B-8DAE-1953F412C126}" type="datetimeFigureOut">
               <a:rPr lang="en-US" smtClean="0"/>
               <a:pPr/>
-              <a:t>11/27/18</a:t>
+              <a:t>11/28/18</a:t>
             </a:fld>
             <a:endParaRPr lang="en-US" dirty="0"/>
           </a:p>
@@ -8245,7 +8245,7 @@
             <a:pPr algn="ctr"/>
             <a:r>
               <a:rPr lang="en-US" dirty="0"/>
-              <a:t>Movie Search</a:t>
+              <a:t>movie Bot</a:t>
             </a:r>
           </a:p>
         </p:txBody>
@@ -8433,7 +8433,7 @@
           <a:p>
             <a:r>
               <a:rPr lang="en-US" dirty="0"/>
-              <a:t>What is Movie Search?</a:t>
+              <a:t>What is movie Bot?</a:t>
             </a:r>
           </a:p>
         </p:txBody>
@@ -8461,7 +8461,7 @@
           <a:p>
             <a:r>
               <a:rPr lang="en-US" dirty="0"/>
-              <a:t>Movie Search is a utility that will provide users with..</a:t>
+              <a:t>movie Bot is a utility that will provide users with..</a:t>
             </a:r>
           </a:p>
           <a:p>
@@ -8712,7 +8712,7 @@
             </a:pPr>
             <a:r>
               <a:rPr lang="en-US" dirty="0"/>
-              <a:t>The Movie Search interface was created using Bootstrap and CSS</a:t>
+              <a:t>The movie Bot interface was created using Bootstrap and CSS</a:t>
             </a:r>
           </a:p>
           <a:p>
@@ -8838,6 +8838,12 @@
         <p:txBody>
           <a:bodyPr/>
           <a:lstStyle/>
+          <a:p>
+            <a:r>
+              <a:rPr lang="en-US"/>
+              <a:t>Search </a:t>
+            </a:r>
+          </a:p>
           <a:p>
             <a:r>
               <a:rPr lang="en-US" dirty="0" err="1"/>

</xml_diff>